<commit_message>
modify diagram and kafka cluster definition
</commit_message>
<xml_diff>
--- a/docs/Diagrams.pptx
+++ b/docs/Diagrams.pptx
@@ -7,12 +7,13 @@
     <p:sldMasterId id="2147484330" r:id="rId3"/>
   </p:sldMasterIdLst>
   <p:notesMasterIdLst>
-    <p:notesMasterId r:id="rId7"/>
+    <p:notesMasterId r:id="rId8"/>
   </p:notesMasterIdLst>
   <p:sldIdLst>
     <p:sldId id="141168483" r:id="rId4"/>
     <p:sldId id="141169041" r:id="rId5"/>
     <p:sldId id="141169046" r:id="rId6"/>
+    <p:sldId id="141169047" r:id="rId7"/>
   </p:sldIdLst>
   <p:sldSz cx="12192000" cy="6858000"/>
   <p:notesSz cx="7086600" cy="9372600"/>
@@ -275,7 +276,7 @@
               <a:pPr>
                 <a:defRPr/>
               </a:pPr>
-              <a:t>4/1/21</a:t>
+              <a:t>4/29/21</a:t>
             </a:fld>
             <a:endParaRPr lang="en-US"/>
           </a:p>
@@ -3602,14 +3603,14 @@
           </a:ln>
           <a:extLst>
             <a:ext uri="{909E8E84-426E-40dd-AFC4-6F175D3DCCD1}">
-              <a14:hiddenFill xmlns:a14="http://schemas.microsoft.com/office/drawing/2010/main" xmlns="">
+              <a14:hiddenFill xmlns="" xmlns:a14="http://schemas.microsoft.com/office/drawing/2010/main">
                 <a:solidFill>
                   <a:srgbClr val="FFFFFF"/>
                 </a:solidFill>
               </a14:hiddenFill>
             </a:ext>
             <a:ext uri="{91240B29-F687-4f45-9708-019B960494DF}">
-              <a14:hiddenLine xmlns:a14="http://schemas.microsoft.com/office/drawing/2010/main" xmlns="" w="9525">
+              <a14:hiddenLine xmlns="" xmlns:a14="http://schemas.microsoft.com/office/drawing/2010/main" w="9525">
                 <a:solidFill>
                   <a:srgbClr val="000000"/>
                 </a:solidFill>
@@ -3661,14 +3662,14 @@
           <a:effectLst/>
           <a:extLst>
             <a:ext uri="{909E8E84-426E-40dd-AFC4-6F175D3DCCD1}">
-              <a14:hiddenFill xmlns:a14="http://schemas.microsoft.com/office/drawing/2010/main" xmlns="">
+              <a14:hiddenFill xmlns="" xmlns:a14="http://schemas.microsoft.com/office/drawing/2010/main">
                 <a:solidFill>
                   <a:schemeClr val="accent1"/>
                 </a:solidFill>
               </a14:hiddenFill>
             </a:ext>
             <a:ext uri="{91240B29-F687-4f45-9708-019B960494DF}">
-              <a14:hiddenLine xmlns:a14="http://schemas.microsoft.com/office/drawing/2010/main" xmlns="" w="9525">
+              <a14:hiddenLine xmlns="" xmlns:a14="http://schemas.microsoft.com/office/drawing/2010/main" w="9525">
                 <a:solidFill>
                   <a:schemeClr val="tx1"/>
                 </a:solidFill>
@@ -3678,7 +3679,7 @@
               </a14:hiddenLine>
             </a:ext>
             <a:ext uri="{AF507438-7753-43e0-B8FC-AC1667EBCBE1}">
-              <a14:hiddenEffects xmlns:a14="http://schemas.microsoft.com/office/drawing/2010/main" xmlns="">
+              <a14:hiddenEffects xmlns="" xmlns:a14="http://schemas.microsoft.com/office/drawing/2010/main">
                 <a:effectLst>
                   <a:outerShdw blurRad="63500" dist="38099" dir="2700000" algn="ctr" rotWithShape="0">
                     <a:schemeClr val="bg2">
@@ -7041,10 +7042,10 @@
           </a:ln>
           <a:extLst>
             <a:ext uri="{FAA26D3D-D897-4be2-8F04-BA451C77F1D7}">
-              <ma14:placeholderFlag xmlns="" xmlns:ma14="http://schemas.microsoft.com/office/mac/drawingml/2011/main" val="1"/>
+              <ma14:placeholderFlag xmlns:ma14="http://schemas.microsoft.com/office/mac/drawingml/2011/main" xmlns="" val="1"/>
             </a:ext>
             <a:ext uri="{909E8E84-426E-40dd-AFC4-6F175D3DCCD1}">
-              <a14:hiddenFill xmlns="" xmlns:a14="http://schemas.microsoft.com/office/drawing/2010/main">
+              <a14:hiddenFill xmlns:a14="http://schemas.microsoft.com/office/drawing/2010/main" xmlns="">
                 <a:solidFill>
                   <a:srgbClr val="FFFFFF"/>
                 </a:solidFill>
@@ -7095,10 +7096,10 @@
           </a:ln>
           <a:extLst>
             <a:ext uri="{FAA26D3D-D897-4be2-8F04-BA451C77F1D7}">
-              <ma14:placeholderFlag xmlns="" xmlns:ma14="http://schemas.microsoft.com/office/mac/drawingml/2011/main" val="1"/>
+              <ma14:placeholderFlag xmlns:ma14="http://schemas.microsoft.com/office/mac/drawingml/2011/main" xmlns="" val="1"/>
             </a:ext>
             <a:ext uri="{909E8E84-426E-40dd-AFC4-6F175D3DCCD1}">
-              <a14:hiddenFill xmlns="" xmlns:a14="http://schemas.microsoft.com/office/drawing/2010/main">
+              <a14:hiddenFill xmlns:a14="http://schemas.microsoft.com/office/drawing/2010/main" xmlns="">
                 <a:solidFill>
                   <a:srgbClr val="FFFFFF"/>
                 </a:solidFill>
@@ -14519,6 +14520,1492 @@
     <p:extLst>
       <p:ext uri="{BB962C8B-B14F-4D97-AF65-F5344CB8AC3E}">
         <p14:creationId xmlns:p14="http://schemas.microsoft.com/office/powerpoint/2010/main" val="2030947871"/>
+      </p:ext>
+    </p:extLst>
+  </p:cSld>
+  <p:clrMapOvr>
+    <a:masterClrMapping/>
+  </p:clrMapOvr>
+</p:sld>
+</file>
+
+<file path=ppt/slides/slide4.xml><?xml version="1.0" encoding="utf-8"?>
+<p:sld xmlns:a="http://schemas.openxmlformats.org/drawingml/2006/main" xmlns:r="http://schemas.openxmlformats.org/officeDocument/2006/relationships" xmlns:p="http://schemas.openxmlformats.org/presentationml/2006/main">
+  <p:cSld>
+    <p:spTree>
+      <p:nvGrpSpPr>
+        <p:cNvPr id="1" name=""/>
+        <p:cNvGrpSpPr/>
+        <p:nvPr/>
+      </p:nvGrpSpPr>
+      <p:grpSpPr>
+        <a:xfrm>
+          <a:off x="0" y="0"/>
+          <a:ext cx="0" cy="0"/>
+          <a:chOff x="0" y="0"/>
+          <a:chExt cx="0" cy="0"/>
+        </a:xfrm>
+      </p:grpSpPr>
+      <p:sp>
+        <p:nvSpPr>
+          <p:cNvPr id="29" name="Cloud 28">
+            <a:extLst>
+              <a:ext uri="{FF2B5EF4-FFF2-40B4-BE49-F238E27FC236}">
+                <a16:creationId xmlns:a16="http://schemas.microsoft.com/office/drawing/2014/main" id="{0A9D3B38-F46A-C044-B58F-B8BB0BC686E2}"/>
+              </a:ext>
+            </a:extLst>
+          </p:cNvPr>
+          <p:cNvSpPr/>
+          <p:nvPr/>
+        </p:nvSpPr>
+        <p:spPr>
+          <a:xfrm>
+            <a:off x="7772368" y="2196230"/>
+            <a:ext cx="3232142" cy="1475873"/>
+          </a:xfrm>
+          <a:prstGeom prst="cloud">
+            <a:avLst/>
+          </a:prstGeom>
+          <a:solidFill>
+            <a:schemeClr val="accent2">
+              <a:lumMod val="20000"/>
+              <a:lumOff val="80000"/>
+            </a:schemeClr>
+          </a:solidFill>
+          <a:ln>
+            <a:solidFill>
+              <a:schemeClr val="accent2">
+                <a:lumMod val="60000"/>
+                <a:lumOff val="40000"/>
+              </a:schemeClr>
+            </a:solidFill>
+          </a:ln>
+          <a:effectLst>
+            <a:outerShdw blurRad="50800" dist="38100" dir="5400000" algn="t" rotWithShape="0">
+              <a:prstClr val="black">
+                <a:alpha val="40000"/>
+              </a:prstClr>
+            </a:outerShdw>
+          </a:effectLst>
+        </p:spPr>
+        <p:style>
+          <a:lnRef idx="2">
+            <a:schemeClr val="accent1">
+              <a:shade val="50000"/>
+            </a:schemeClr>
+          </a:lnRef>
+          <a:fillRef idx="1">
+            <a:schemeClr val="accent1"/>
+          </a:fillRef>
+          <a:effectRef idx="0">
+            <a:schemeClr val="accent1"/>
+          </a:effectRef>
+          <a:fontRef idx="minor">
+            <a:schemeClr val="lt1"/>
+          </a:fontRef>
+        </p:style>
+        <p:txBody>
+          <a:bodyPr rtlCol="0" anchor="t"/>
+          <a:lstStyle/>
+          <a:p>
+            <a:pPr marL="0" marR="0" indent="0" algn="ctr" defTabSz="685800" rtl="0" eaLnBrk="1" fontAlgn="auto" latinLnBrk="0" hangingPunct="1">
+              <a:lnSpc>
+                <a:spcPct val="100000"/>
+              </a:lnSpc>
+              <a:spcBef>
+                <a:spcPts val="0"/>
+              </a:spcBef>
+              <a:spcAft>
+                <a:spcPts val="0"/>
+              </a:spcAft>
+              <a:buClrTx/>
+              <a:buSzTx/>
+              <a:buFontTx/>
+              <a:buNone/>
+              <a:tabLst/>
+            </a:pPr>
+            <a:r>
+              <a:rPr kumimoji="0" lang="en-US" sz="1100" b="0" i="0" u="none" strike="noStrike" kern="1200" cap="none" spc="0" normalizeH="0" baseline="0" noProof="0" dirty="0">
+                <a:ln>
+                  <a:noFill/>
+                </a:ln>
+                <a:solidFill>
+                  <a:schemeClr val="accent1">
+                    <a:lumMod val="75000"/>
+                  </a:schemeClr>
+                </a:solidFill>
+                <a:effectLst/>
+                <a:uLnTx/>
+                <a:uFillTx/>
+                <a:latin typeface="Arial"/>
+                <a:ea typeface="+mn-ea"/>
+                <a:cs typeface="+mn-cs"/>
+              </a:rPr>
+              <a:t>IBM Cloud</a:t>
+            </a:r>
+          </a:p>
+        </p:txBody>
+      </p:sp>
+      <p:sp>
+        <p:nvSpPr>
+          <p:cNvPr id="2" name="Title 1">
+            <a:extLst>
+              <a:ext uri="{FF2B5EF4-FFF2-40B4-BE49-F238E27FC236}">
+                <a16:creationId xmlns:a16="http://schemas.microsoft.com/office/drawing/2014/main" id="{0A85613D-7463-3C42-9BD9-47E0B357C9E0}"/>
+              </a:ext>
+            </a:extLst>
+          </p:cNvPr>
+          <p:cNvSpPr>
+            <a:spLocks noGrp="1"/>
+          </p:cNvSpPr>
+          <p:nvPr>
+            <p:ph type="title"/>
+          </p:nvPr>
+        </p:nvSpPr>
+        <p:spPr/>
+        <p:txBody>
+          <a:bodyPr/>
+          <a:lstStyle/>
+          <a:p>
+            <a:r>
+              <a:rPr lang="en-US" dirty="0"/>
+              <a:t>MongoDB Sink</a:t>
+            </a:r>
+            <a:endParaRPr dirty="0"/>
+          </a:p>
+        </p:txBody>
+      </p:sp>
+      <p:sp>
+        <p:nvSpPr>
+          <p:cNvPr id="4" name="Slide Number Placeholder 3">
+            <a:extLst>
+              <a:ext uri="{FF2B5EF4-FFF2-40B4-BE49-F238E27FC236}">
+                <a16:creationId xmlns:a16="http://schemas.microsoft.com/office/drawing/2014/main" id="{67A54E3B-42B4-7740-BCEF-174D869777C5}"/>
+              </a:ext>
+            </a:extLst>
+          </p:cNvPr>
+          <p:cNvSpPr>
+            <a:spLocks noGrp="1"/>
+          </p:cNvSpPr>
+          <p:nvPr>
+            <p:ph type="sldNum" sz="quarter" idx="10"/>
+          </p:nvPr>
+        </p:nvSpPr>
+        <p:spPr/>
+        <p:txBody>
+          <a:bodyPr/>
+          <a:lstStyle/>
+          <a:p>
+            <a:pPr defTabSz="914377" fontAlgn="auto">
+              <a:spcBef>
+                <a:spcPts val="0"/>
+              </a:spcBef>
+              <a:spcAft>
+                <a:spcPts val="0"/>
+              </a:spcAft>
+            </a:pPr>
+            <a:fld id="{2F63A97E-D605-DC42-8452-C14CD1FA87FA}" type="slidenum">
+              <a:rPr lang="en-US">
+                <a:solidFill>
+                  <a:srgbClr val="5AAAFA"/>
+                </a:solidFill>
+                <a:latin typeface="Arial"/>
+                <a:cs typeface="+mn-cs"/>
+              </a:rPr>
+              <a:pPr defTabSz="914377" fontAlgn="auto">
+                <a:spcBef>
+                  <a:spcPts val="0"/>
+                </a:spcBef>
+                <a:spcAft>
+                  <a:spcPts val="0"/>
+                </a:spcAft>
+              </a:pPr>
+              <a:t>4</a:t>
+            </a:fld>
+            <a:endParaRPr lang="en-US">
+              <a:solidFill>
+                <a:srgbClr val="5AAAFA"/>
+              </a:solidFill>
+              <a:latin typeface="Arial"/>
+              <a:cs typeface="+mn-cs"/>
+            </a:endParaRPr>
+          </a:p>
+        </p:txBody>
+      </p:sp>
+      <p:sp>
+        <p:nvSpPr>
+          <p:cNvPr id="5" name="Rounded Rectangle 4">
+            <a:extLst>
+              <a:ext uri="{FF2B5EF4-FFF2-40B4-BE49-F238E27FC236}">
+                <a16:creationId xmlns:a16="http://schemas.microsoft.com/office/drawing/2014/main" id="{4304F71B-11D6-5F4A-A33F-34FF2EA0396A}"/>
+              </a:ext>
+            </a:extLst>
+          </p:cNvPr>
+          <p:cNvSpPr/>
+          <p:nvPr/>
+        </p:nvSpPr>
+        <p:spPr bwMode="auto">
+          <a:xfrm>
+            <a:off x="3106270" y="3466423"/>
+            <a:ext cx="245561" cy="731512"/>
+          </a:xfrm>
+          <a:prstGeom prst="roundRect">
+            <a:avLst/>
+          </a:prstGeom>
+          <a:solidFill>
+            <a:schemeClr val="accent1">
+              <a:lumMod val="60000"/>
+              <a:lumOff val="40000"/>
+            </a:schemeClr>
+          </a:solidFill>
+          <a:ln>
+            <a:solidFill>
+              <a:schemeClr val="bg1"/>
+            </a:solidFill>
+            <a:prstDash val="solid"/>
+            <a:headEnd type="none" w="med" len="med"/>
+            <a:tailEnd type="none" w="med" len="med"/>
+          </a:ln>
+          <a:effectLst/>
+        </p:spPr>
+        <p:style>
+          <a:lnRef idx="1">
+            <a:schemeClr val="accent5"/>
+          </a:lnRef>
+          <a:fillRef idx="3">
+            <a:schemeClr val="accent5"/>
+          </a:fillRef>
+          <a:effectRef idx="2">
+            <a:schemeClr val="accent5"/>
+          </a:effectRef>
+          <a:fontRef idx="minor">
+            <a:schemeClr val="lt1"/>
+          </a:fontRef>
+        </p:style>
+        <p:txBody>
+          <a:bodyPr vert="horz" wrap="square" lIns="0" tIns="0" rIns="0" bIns="0" numCol="1" rtlCol="0" anchor="ctr" anchorCtr="0" compatLnSpc="1">
+            <a:prstTxWarp prst="textNoShape">
+              <a:avLst/>
+            </a:prstTxWarp>
+            <a:noAutofit/>
+          </a:bodyPr>
+          <a:lstStyle/>
+          <a:p>
+            <a:pPr algn="ctr" defTabSz="1219110" eaLnBrk="1" fontAlgn="auto" hangingPunct="1">
+              <a:lnSpc>
+                <a:spcPct val="90000"/>
+              </a:lnSpc>
+              <a:spcBef>
+                <a:spcPts val="0"/>
+              </a:spcBef>
+              <a:spcAft>
+                <a:spcPts val="0"/>
+              </a:spcAft>
+            </a:pPr>
+            <a:r>
+              <a:rPr lang="en-US" sz="1200">
+                <a:solidFill>
+                  <a:prstClr val="white"/>
+                </a:solidFill>
+                <a:latin typeface="Arial"/>
+              </a:rPr>
+              <a:t>0</a:t>
+            </a:r>
+            <a:endParaRPr lang="en-US" sz="667">
+              <a:solidFill>
+                <a:prstClr val="white"/>
+              </a:solidFill>
+              <a:latin typeface="Arial"/>
+            </a:endParaRPr>
+          </a:p>
+        </p:txBody>
+      </p:sp>
+      <p:sp>
+        <p:nvSpPr>
+          <p:cNvPr id="6" name="Rounded Rectangle 5">
+            <a:extLst>
+              <a:ext uri="{FF2B5EF4-FFF2-40B4-BE49-F238E27FC236}">
+                <a16:creationId xmlns:a16="http://schemas.microsoft.com/office/drawing/2014/main" id="{792A766C-4035-7A46-A089-7597F4D3C367}"/>
+              </a:ext>
+            </a:extLst>
+          </p:cNvPr>
+          <p:cNvSpPr/>
+          <p:nvPr/>
+        </p:nvSpPr>
+        <p:spPr bwMode="auto">
+          <a:xfrm>
+            <a:off x="3350106" y="3466423"/>
+            <a:ext cx="245561" cy="731512"/>
+          </a:xfrm>
+          <a:prstGeom prst="roundRect">
+            <a:avLst/>
+          </a:prstGeom>
+          <a:solidFill>
+            <a:schemeClr val="accent1">
+              <a:lumMod val="60000"/>
+              <a:lumOff val="40000"/>
+            </a:schemeClr>
+          </a:solidFill>
+          <a:ln>
+            <a:solidFill>
+              <a:schemeClr val="bg1"/>
+            </a:solidFill>
+            <a:prstDash val="solid"/>
+            <a:headEnd type="none" w="med" len="med"/>
+            <a:tailEnd type="none" w="med" len="med"/>
+          </a:ln>
+          <a:effectLst/>
+        </p:spPr>
+        <p:style>
+          <a:lnRef idx="1">
+            <a:schemeClr val="accent5"/>
+          </a:lnRef>
+          <a:fillRef idx="3">
+            <a:schemeClr val="accent5"/>
+          </a:fillRef>
+          <a:effectRef idx="2">
+            <a:schemeClr val="accent5"/>
+          </a:effectRef>
+          <a:fontRef idx="minor">
+            <a:schemeClr val="lt1"/>
+          </a:fontRef>
+        </p:style>
+        <p:txBody>
+          <a:bodyPr vert="horz" wrap="square" lIns="0" tIns="0" rIns="0" bIns="0" numCol="1" rtlCol="0" anchor="ctr" anchorCtr="0" compatLnSpc="1">
+            <a:prstTxWarp prst="textNoShape">
+              <a:avLst/>
+            </a:prstTxWarp>
+            <a:noAutofit/>
+          </a:bodyPr>
+          <a:lstStyle/>
+          <a:p>
+            <a:pPr algn="ctr" defTabSz="1219110" eaLnBrk="1" fontAlgn="auto" hangingPunct="1">
+              <a:lnSpc>
+                <a:spcPct val="90000"/>
+              </a:lnSpc>
+              <a:spcBef>
+                <a:spcPts val="0"/>
+              </a:spcBef>
+              <a:spcAft>
+                <a:spcPts val="0"/>
+              </a:spcAft>
+            </a:pPr>
+            <a:r>
+              <a:rPr lang="en-US" sz="1200">
+                <a:solidFill>
+                  <a:prstClr val="white"/>
+                </a:solidFill>
+                <a:latin typeface="Arial"/>
+              </a:rPr>
+              <a:t>1</a:t>
+            </a:r>
+            <a:endParaRPr lang="en-US" sz="667">
+              <a:solidFill>
+                <a:prstClr val="white"/>
+              </a:solidFill>
+              <a:latin typeface="Arial"/>
+            </a:endParaRPr>
+          </a:p>
+        </p:txBody>
+      </p:sp>
+      <p:sp>
+        <p:nvSpPr>
+          <p:cNvPr id="7" name="Rounded Rectangle 6">
+            <a:extLst>
+              <a:ext uri="{FF2B5EF4-FFF2-40B4-BE49-F238E27FC236}">
+                <a16:creationId xmlns:a16="http://schemas.microsoft.com/office/drawing/2014/main" id="{7E4F924E-E16B-9B4C-BDE5-B5FA77918438}"/>
+              </a:ext>
+            </a:extLst>
+          </p:cNvPr>
+          <p:cNvSpPr/>
+          <p:nvPr/>
+        </p:nvSpPr>
+        <p:spPr bwMode="auto">
+          <a:xfrm>
+            <a:off x="3595669" y="3466423"/>
+            <a:ext cx="245561" cy="731512"/>
+          </a:xfrm>
+          <a:prstGeom prst="roundRect">
+            <a:avLst/>
+          </a:prstGeom>
+          <a:solidFill>
+            <a:schemeClr val="accent1">
+              <a:lumMod val="60000"/>
+              <a:lumOff val="40000"/>
+            </a:schemeClr>
+          </a:solidFill>
+          <a:ln>
+            <a:solidFill>
+              <a:schemeClr val="bg1"/>
+            </a:solidFill>
+            <a:prstDash val="solid"/>
+            <a:headEnd type="none" w="med" len="med"/>
+            <a:tailEnd type="none" w="med" len="med"/>
+          </a:ln>
+          <a:effectLst/>
+        </p:spPr>
+        <p:style>
+          <a:lnRef idx="1">
+            <a:schemeClr val="accent5"/>
+          </a:lnRef>
+          <a:fillRef idx="3">
+            <a:schemeClr val="accent5"/>
+          </a:fillRef>
+          <a:effectRef idx="2">
+            <a:schemeClr val="accent5"/>
+          </a:effectRef>
+          <a:fontRef idx="minor">
+            <a:schemeClr val="lt1"/>
+          </a:fontRef>
+        </p:style>
+        <p:txBody>
+          <a:bodyPr vert="horz" wrap="square" lIns="0" tIns="0" rIns="0" bIns="0" numCol="1" rtlCol="0" anchor="ctr" anchorCtr="0" compatLnSpc="1">
+            <a:prstTxWarp prst="textNoShape">
+              <a:avLst/>
+            </a:prstTxWarp>
+            <a:noAutofit/>
+          </a:bodyPr>
+          <a:lstStyle/>
+          <a:p>
+            <a:pPr algn="ctr" defTabSz="1219110" eaLnBrk="1" fontAlgn="auto" hangingPunct="1">
+              <a:lnSpc>
+                <a:spcPct val="90000"/>
+              </a:lnSpc>
+              <a:spcBef>
+                <a:spcPts val="0"/>
+              </a:spcBef>
+              <a:spcAft>
+                <a:spcPts val="0"/>
+              </a:spcAft>
+            </a:pPr>
+            <a:r>
+              <a:rPr lang="en-US" sz="1200">
+                <a:solidFill>
+                  <a:prstClr val="white"/>
+                </a:solidFill>
+                <a:latin typeface="Arial"/>
+              </a:rPr>
+              <a:t>2</a:t>
+            </a:r>
+            <a:endParaRPr lang="en-US" sz="667">
+              <a:solidFill>
+                <a:prstClr val="white"/>
+              </a:solidFill>
+              <a:latin typeface="Arial"/>
+            </a:endParaRPr>
+          </a:p>
+        </p:txBody>
+      </p:sp>
+      <p:sp>
+        <p:nvSpPr>
+          <p:cNvPr id="8" name="Rounded Rectangle 7">
+            <a:extLst>
+              <a:ext uri="{FF2B5EF4-FFF2-40B4-BE49-F238E27FC236}">
+                <a16:creationId xmlns:a16="http://schemas.microsoft.com/office/drawing/2014/main" id="{11D38582-539D-F94D-BDAF-120652A906B1}"/>
+              </a:ext>
+            </a:extLst>
+          </p:cNvPr>
+          <p:cNvSpPr/>
+          <p:nvPr/>
+        </p:nvSpPr>
+        <p:spPr bwMode="auto">
+          <a:xfrm>
+            <a:off x="3839506" y="3466423"/>
+            <a:ext cx="245561" cy="731512"/>
+          </a:xfrm>
+          <a:prstGeom prst="roundRect">
+            <a:avLst/>
+          </a:prstGeom>
+          <a:solidFill>
+            <a:schemeClr val="accent1">
+              <a:lumMod val="60000"/>
+              <a:lumOff val="40000"/>
+            </a:schemeClr>
+          </a:solidFill>
+          <a:ln>
+            <a:solidFill>
+              <a:schemeClr val="bg1"/>
+            </a:solidFill>
+            <a:prstDash val="solid"/>
+            <a:headEnd type="none" w="med" len="med"/>
+            <a:tailEnd type="none" w="med" len="med"/>
+          </a:ln>
+          <a:effectLst/>
+        </p:spPr>
+        <p:style>
+          <a:lnRef idx="1">
+            <a:schemeClr val="accent5"/>
+          </a:lnRef>
+          <a:fillRef idx="3">
+            <a:schemeClr val="accent5"/>
+          </a:fillRef>
+          <a:effectRef idx="2">
+            <a:schemeClr val="accent5"/>
+          </a:effectRef>
+          <a:fontRef idx="minor">
+            <a:schemeClr val="lt1"/>
+          </a:fontRef>
+        </p:style>
+        <p:txBody>
+          <a:bodyPr vert="horz" wrap="square" lIns="0" tIns="0" rIns="0" bIns="0" numCol="1" rtlCol="0" anchor="ctr" anchorCtr="0" compatLnSpc="1">
+            <a:prstTxWarp prst="textNoShape">
+              <a:avLst/>
+            </a:prstTxWarp>
+            <a:noAutofit/>
+          </a:bodyPr>
+          <a:lstStyle/>
+          <a:p>
+            <a:pPr algn="ctr" defTabSz="1219110" eaLnBrk="1" fontAlgn="auto" hangingPunct="1">
+              <a:lnSpc>
+                <a:spcPct val="90000"/>
+              </a:lnSpc>
+              <a:spcBef>
+                <a:spcPts val="0"/>
+              </a:spcBef>
+              <a:spcAft>
+                <a:spcPts val="0"/>
+              </a:spcAft>
+            </a:pPr>
+            <a:r>
+              <a:rPr lang="en-US" sz="1200">
+                <a:solidFill>
+                  <a:prstClr val="white"/>
+                </a:solidFill>
+                <a:latin typeface="Arial"/>
+              </a:rPr>
+              <a:t>3</a:t>
+            </a:r>
+            <a:endParaRPr lang="en-US" sz="667">
+              <a:solidFill>
+                <a:prstClr val="white"/>
+              </a:solidFill>
+              <a:latin typeface="Arial"/>
+            </a:endParaRPr>
+          </a:p>
+        </p:txBody>
+      </p:sp>
+      <p:sp>
+        <p:nvSpPr>
+          <p:cNvPr id="9" name="Rounded Rectangle 8">
+            <a:extLst>
+              <a:ext uri="{FF2B5EF4-FFF2-40B4-BE49-F238E27FC236}">
+                <a16:creationId xmlns:a16="http://schemas.microsoft.com/office/drawing/2014/main" id="{1E8BFF02-AB38-6F42-A6CB-76FFEB799B2A}"/>
+              </a:ext>
+            </a:extLst>
+          </p:cNvPr>
+          <p:cNvSpPr/>
+          <p:nvPr/>
+        </p:nvSpPr>
+        <p:spPr bwMode="auto">
+          <a:xfrm>
+            <a:off x="4085066" y="3466423"/>
+            <a:ext cx="245561" cy="731512"/>
+          </a:xfrm>
+          <a:prstGeom prst="roundRect">
+            <a:avLst/>
+          </a:prstGeom>
+          <a:solidFill>
+            <a:schemeClr val="accent1">
+              <a:lumMod val="60000"/>
+              <a:lumOff val="40000"/>
+            </a:schemeClr>
+          </a:solidFill>
+          <a:ln>
+            <a:solidFill>
+              <a:schemeClr val="bg1"/>
+            </a:solidFill>
+            <a:prstDash val="solid"/>
+            <a:headEnd type="none" w="med" len="med"/>
+            <a:tailEnd type="none" w="med" len="med"/>
+          </a:ln>
+          <a:effectLst/>
+        </p:spPr>
+        <p:style>
+          <a:lnRef idx="1">
+            <a:schemeClr val="accent5"/>
+          </a:lnRef>
+          <a:fillRef idx="3">
+            <a:schemeClr val="accent5"/>
+          </a:fillRef>
+          <a:effectRef idx="2">
+            <a:schemeClr val="accent5"/>
+          </a:effectRef>
+          <a:fontRef idx="minor">
+            <a:schemeClr val="lt1"/>
+          </a:fontRef>
+        </p:style>
+        <p:txBody>
+          <a:bodyPr vert="horz" wrap="square" lIns="0" tIns="0" rIns="0" bIns="0" numCol="1" rtlCol="0" anchor="ctr" anchorCtr="0" compatLnSpc="1">
+            <a:prstTxWarp prst="textNoShape">
+              <a:avLst/>
+            </a:prstTxWarp>
+            <a:noAutofit/>
+          </a:bodyPr>
+          <a:lstStyle/>
+          <a:p>
+            <a:pPr algn="ctr" defTabSz="1219110" eaLnBrk="1" fontAlgn="auto" hangingPunct="1">
+              <a:lnSpc>
+                <a:spcPct val="90000"/>
+              </a:lnSpc>
+              <a:spcBef>
+                <a:spcPts val="0"/>
+              </a:spcBef>
+              <a:spcAft>
+                <a:spcPts val="0"/>
+              </a:spcAft>
+            </a:pPr>
+            <a:r>
+              <a:rPr lang="en-US" sz="1200">
+                <a:solidFill>
+                  <a:prstClr val="white"/>
+                </a:solidFill>
+                <a:latin typeface="Arial"/>
+              </a:rPr>
+              <a:t>4</a:t>
+            </a:r>
+            <a:endParaRPr lang="en-US" sz="667">
+              <a:solidFill>
+                <a:prstClr val="white"/>
+              </a:solidFill>
+              <a:latin typeface="Arial"/>
+            </a:endParaRPr>
+          </a:p>
+        </p:txBody>
+      </p:sp>
+      <p:sp>
+        <p:nvSpPr>
+          <p:cNvPr id="10" name="Rounded Rectangle 9">
+            <a:extLst>
+              <a:ext uri="{FF2B5EF4-FFF2-40B4-BE49-F238E27FC236}">
+                <a16:creationId xmlns:a16="http://schemas.microsoft.com/office/drawing/2014/main" id="{09086E3C-7239-3247-949B-DEEC9D00C281}"/>
+              </a:ext>
+            </a:extLst>
+          </p:cNvPr>
+          <p:cNvSpPr/>
+          <p:nvPr/>
+        </p:nvSpPr>
+        <p:spPr bwMode="auto">
+          <a:xfrm>
+            <a:off x="4315862" y="3466423"/>
+            <a:ext cx="245561" cy="731512"/>
+          </a:xfrm>
+          <a:prstGeom prst="roundRect">
+            <a:avLst/>
+          </a:prstGeom>
+          <a:solidFill>
+            <a:schemeClr val="accent1">
+              <a:lumMod val="60000"/>
+              <a:lumOff val="40000"/>
+            </a:schemeClr>
+          </a:solidFill>
+          <a:ln>
+            <a:solidFill>
+              <a:schemeClr val="bg1"/>
+            </a:solidFill>
+            <a:prstDash val="solid"/>
+            <a:headEnd type="none" w="med" len="med"/>
+            <a:tailEnd type="none" w="med" len="med"/>
+          </a:ln>
+          <a:effectLst/>
+        </p:spPr>
+        <p:style>
+          <a:lnRef idx="1">
+            <a:schemeClr val="accent5"/>
+          </a:lnRef>
+          <a:fillRef idx="3">
+            <a:schemeClr val="accent5"/>
+          </a:fillRef>
+          <a:effectRef idx="2">
+            <a:schemeClr val="accent5"/>
+          </a:effectRef>
+          <a:fontRef idx="minor">
+            <a:schemeClr val="lt1"/>
+          </a:fontRef>
+        </p:style>
+        <p:txBody>
+          <a:bodyPr vert="horz" wrap="square" lIns="0" tIns="0" rIns="0" bIns="0" numCol="1" rtlCol="0" anchor="ctr" anchorCtr="0" compatLnSpc="1">
+            <a:prstTxWarp prst="textNoShape">
+              <a:avLst/>
+            </a:prstTxWarp>
+            <a:noAutofit/>
+          </a:bodyPr>
+          <a:lstStyle/>
+          <a:p>
+            <a:pPr algn="ctr" defTabSz="1219110" eaLnBrk="1" fontAlgn="auto" hangingPunct="1">
+              <a:lnSpc>
+                <a:spcPct val="90000"/>
+              </a:lnSpc>
+              <a:spcBef>
+                <a:spcPts val="0"/>
+              </a:spcBef>
+              <a:spcAft>
+                <a:spcPts val="0"/>
+              </a:spcAft>
+            </a:pPr>
+            <a:r>
+              <a:rPr lang="en-US" sz="1200">
+                <a:solidFill>
+                  <a:prstClr val="white"/>
+                </a:solidFill>
+                <a:latin typeface="Arial"/>
+              </a:rPr>
+              <a:t>5</a:t>
+            </a:r>
+            <a:endParaRPr lang="en-US" sz="667">
+              <a:solidFill>
+                <a:prstClr val="white"/>
+              </a:solidFill>
+              <a:latin typeface="Arial"/>
+            </a:endParaRPr>
+          </a:p>
+        </p:txBody>
+      </p:sp>
+      <p:sp>
+        <p:nvSpPr>
+          <p:cNvPr id="11" name="TextBox 10">
+            <a:extLst>
+              <a:ext uri="{FF2B5EF4-FFF2-40B4-BE49-F238E27FC236}">
+                <a16:creationId xmlns:a16="http://schemas.microsoft.com/office/drawing/2014/main" id="{380BAE2F-D39F-2A4D-AF02-BA85181FE490}"/>
+              </a:ext>
+            </a:extLst>
+          </p:cNvPr>
+          <p:cNvSpPr txBox="1"/>
+          <p:nvPr/>
+        </p:nvSpPr>
+        <p:spPr>
+          <a:xfrm>
+            <a:off x="3039673" y="4153275"/>
+            <a:ext cx="607859" cy="300210"/>
+          </a:xfrm>
+          <a:prstGeom prst="rect">
+            <a:avLst/>
+          </a:prstGeom>
+          <a:noFill/>
+        </p:spPr>
+        <p:txBody>
+          <a:bodyPr wrap="none" rtlCol="0">
+            <a:spAutoFit/>
+          </a:bodyPr>
+          <a:lstStyle/>
+          <a:p>
+            <a:pPr defTabSz="914377" eaLnBrk="1" fontAlgn="auto" hangingPunct="1">
+              <a:spcBef>
+                <a:spcPts val="0"/>
+              </a:spcBef>
+              <a:spcAft>
+                <a:spcPts val="0"/>
+              </a:spcAft>
+            </a:pPr>
+            <a:r>
+              <a:rPr lang="en-US" sz="1351" dirty="0">
+                <a:solidFill>
+                  <a:srgbClr val="4178BE">
+                    <a:lumMod val="25000"/>
+                  </a:srgbClr>
+                </a:solidFill>
+                <a:latin typeface="Arial"/>
+                <a:cs typeface="+mn-cs"/>
+              </a:rPr>
+              <a:t>Items</a:t>
+            </a:r>
+          </a:p>
+        </p:txBody>
+      </p:sp>
+      <p:sp>
+        <p:nvSpPr>
+          <p:cNvPr id="12" name="AutoShape 4">
+            <a:extLst>
+              <a:ext uri="{FF2B5EF4-FFF2-40B4-BE49-F238E27FC236}">
+                <a16:creationId xmlns:a16="http://schemas.microsoft.com/office/drawing/2014/main" id="{765137EE-26C5-FE42-9A07-FED56F27BA3F}"/>
+              </a:ext>
+            </a:extLst>
+          </p:cNvPr>
+          <p:cNvSpPr>
+            <a:spLocks noChangeArrowheads="1"/>
+          </p:cNvSpPr>
+          <p:nvPr/>
+        </p:nvSpPr>
+        <p:spPr bwMode="auto">
+          <a:xfrm>
+            <a:off x="2238604" y="3269223"/>
+            <a:ext cx="4752505" cy="1214997"/>
+          </a:xfrm>
+          <a:prstGeom prst="roundRect">
+            <a:avLst>
+              <a:gd name="adj" fmla="val 7117"/>
+            </a:avLst>
+          </a:prstGeom>
+          <a:noFill/>
+          <a:ln w="12700">
+            <a:solidFill>
+              <a:schemeClr val="accent3"/>
+            </a:solidFill>
+            <a:prstDash val="dash"/>
+            <a:round/>
+            <a:headEnd/>
+            <a:tailEnd/>
+          </a:ln>
+        </p:spPr>
+        <p:txBody>
+          <a:bodyPr lIns="0" tIns="0" rIns="0" bIns="0" anchor="b" anchorCtr="1"/>
+          <a:lstStyle/>
+          <a:p>
+            <a:pPr algn="ctr" defTabSz="914377" eaLnBrk="1" fontAlgn="auto" hangingPunct="1">
+              <a:spcBef>
+                <a:spcPts val="0"/>
+              </a:spcBef>
+              <a:spcAft>
+                <a:spcPts val="0"/>
+              </a:spcAft>
+            </a:pPr>
+            <a:endParaRPr lang="en-US" sz="1333">
+              <a:solidFill>
+                <a:prstClr val="black"/>
+              </a:solidFill>
+              <a:latin typeface="Arial"/>
+              <a:cs typeface="+mn-cs"/>
+            </a:endParaRPr>
+          </a:p>
+        </p:txBody>
+      </p:sp>
+      <p:sp>
+        <p:nvSpPr>
+          <p:cNvPr id="14" name="Rectangle 13">
+            <a:extLst>
+              <a:ext uri="{FF2B5EF4-FFF2-40B4-BE49-F238E27FC236}">
+                <a16:creationId xmlns:a16="http://schemas.microsoft.com/office/drawing/2014/main" id="{2CE172AC-D05C-424A-8E8B-D1EC341237D5}"/>
+              </a:ext>
+            </a:extLst>
+          </p:cNvPr>
+          <p:cNvSpPr/>
+          <p:nvPr/>
+        </p:nvSpPr>
+        <p:spPr>
+          <a:xfrm>
+            <a:off x="344807" y="1478025"/>
+            <a:ext cx="1080516" cy="1066506"/>
+          </a:xfrm>
+          <a:prstGeom prst="rect">
+            <a:avLst/>
+          </a:prstGeom>
+          <a:noFill/>
+          <a:ln w="12700">
+            <a:solidFill>
+              <a:srgbClr val="0000FF"/>
+            </a:solidFill>
+          </a:ln>
+        </p:spPr>
+        <p:style>
+          <a:lnRef idx="2">
+            <a:schemeClr val="accent1">
+              <a:shade val="50000"/>
+            </a:schemeClr>
+          </a:lnRef>
+          <a:fillRef idx="1">
+            <a:schemeClr val="accent1"/>
+          </a:fillRef>
+          <a:effectRef idx="0">
+            <a:schemeClr val="accent1"/>
+          </a:effectRef>
+          <a:fontRef idx="minor">
+            <a:schemeClr val="lt1"/>
+          </a:fontRef>
+        </p:style>
+        <p:txBody>
+          <a:bodyPr rtlCol="0" anchor="ctr"/>
+          <a:lstStyle/>
+          <a:p>
+            <a:pPr algn="ctr" defTabSz="914354" eaLnBrk="1" fontAlgn="auto" hangingPunct="1">
+              <a:spcBef>
+                <a:spcPts val="0"/>
+              </a:spcBef>
+              <a:spcAft>
+                <a:spcPts val="0"/>
+              </a:spcAft>
+            </a:pPr>
+            <a:r>
+              <a:rPr lang="en-US" sz="1333" dirty="0">
+                <a:solidFill>
+                  <a:srgbClr val="0000FF"/>
+                </a:solidFill>
+                <a:latin typeface="Arial"/>
+              </a:rPr>
+              <a:t>Store Simulator</a:t>
+            </a:r>
+          </a:p>
+          <a:p>
+            <a:pPr algn="ctr" defTabSz="914354" eaLnBrk="1" fontAlgn="auto" hangingPunct="1">
+              <a:spcBef>
+                <a:spcPts val="0"/>
+              </a:spcBef>
+              <a:spcAft>
+                <a:spcPts val="0"/>
+              </a:spcAft>
+            </a:pPr>
+            <a:r>
+              <a:rPr lang="en-US" sz="1333" dirty="0">
+                <a:solidFill>
+                  <a:srgbClr val="0000FF"/>
+                </a:solidFill>
+                <a:latin typeface="Arial"/>
+              </a:rPr>
+              <a:t>App</a:t>
+            </a:r>
+          </a:p>
+        </p:txBody>
+      </p:sp>
+      <p:sp>
+        <p:nvSpPr>
+          <p:cNvPr id="22" name="Rectangle 21">
+            <a:extLst>
+              <a:ext uri="{FF2B5EF4-FFF2-40B4-BE49-F238E27FC236}">
+                <a16:creationId xmlns:a16="http://schemas.microsoft.com/office/drawing/2014/main" id="{FFE0AE6D-D131-4E47-B1B7-5A9D6856F1D9}"/>
+              </a:ext>
+            </a:extLst>
+          </p:cNvPr>
+          <p:cNvSpPr/>
+          <p:nvPr/>
+        </p:nvSpPr>
+        <p:spPr>
+          <a:xfrm>
+            <a:off x="419926" y="2415222"/>
+            <a:ext cx="925779" cy="306869"/>
+          </a:xfrm>
+          <a:prstGeom prst="rect">
+            <a:avLst/>
+          </a:prstGeom>
+          <a:solidFill>
+            <a:schemeClr val="bg1"/>
+          </a:solidFill>
+          <a:ln>
+            <a:noFill/>
+          </a:ln>
+        </p:spPr>
+        <p:style>
+          <a:lnRef idx="2">
+            <a:schemeClr val="accent1">
+              <a:shade val="50000"/>
+            </a:schemeClr>
+          </a:lnRef>
+          <a:fillRef idx="1">
+            <a:schemeClr val="accent1"/>
+          </a:fillRef>
+          <a:effectRef idx="0">
+            <a:schemeClr val="accent1"/>
+          </a:effectRef>
+          <a:fontRef idx="minor">
+            <a:schemeClr val="lt1"/>
+          </a:fontRef>
+        </p:style>
+        <p:txBody>
+          <a:bodyPr rtlCol="0" anchor="t"/>
+          <a:lstStyle/>
+          <a:p>
+            <a:pPr defTabSz="914354" eaLnBrk="1" fontAlgn="auto" hangingPunct="1">
+              <a:spcBef>
+                <a:spcPts val="0"/>
+              </a:spcBef>
+              <a:spcAft>
+                <a:spcPts val="0"/>
+              </a:spcAft>
+            </a:pPr>
+            <a:endParaRPr lang="en-US" sz="1333">
+              <a:solidFill>
+                <a:prstClr val="white"/>
+              </a:solidFill>
+              <a:latin typeface="Arial"/>
+            </a:endParaRPr>
+          </a:p>
+        </p:txBody>
+      </p:sp>
+      <p:sp>
+        <p:nvSpPr>
+          <p:cNvPr id="23" name="Rectangle 22">
+            <a:extLst>
+              <a:ext uri="{FF2B5EF4-FFF2-40B4-BE49-F238E27FC236}">
+                <a16:creationId xmlns:a16="http://schemas.microsoft.com/office/drawing/2014/main" id="{35C7297C-F5DA-284A-8676-1377E94C6E8E}"/>
+              </a:ext>
+            </a:extLst>
+          </p:cNvPr>
+          <p:cNvSpPr/>
+          <p:nvPr/>
+        </p:nvSpPr>
+        <p:spPr>
+          <a:xfrm>
+            <a:off x="1774791" y="2212027"/>
+            <a:ext cx="981588" cy="203196"/>
+          </a:xfrm>
+          <a:prstGeom prst="rect">
+            <a:avLst/>
+          </a:prstGeom>
+          <a:solidFill>
+            <a:schemeClr val="bg1"/>
+          </a:solidFill>
+          <a:ln>
+            <a:noFill/>
+          </a:ln>
+        </p:spPr>
+        <p:style>
+          <a:lnRef idx="2">
+            <a:schemeClr val="accent1">
+              <a:shade val="50000"/>
+            </a:schemeClr>
+          </a:lnRef>
+          <a:fillRef idx="1">
+            <a:schemeClr val="accent1"/>
+          </a:fillRef>
+          <a:effectRef idx="0">
+            <a:schemeClr val="accent1"/>
+          </a:effectRef>
+          <a:fontRef idx="minor">
+            <a:schemeClr val="lt1"/>
+          </a:fontRef>
+        </p:style>
+        <p:txBody>
+          <a:bodyPr rtlCol="0" anchor="t"/>
+          <a:lstStyle/>
+          <a:p>
+            <a:pPr defTabSz="914354" eaLnBrk="1" fontAlgn="auto" hangingPunct="1">
+              <a:spcBef>
+                <a:spcPts val="0"/>
+              </a:spcBef>
+              <a:spcAft>
+                <a:spcPts val="0"/>
+              </a:spcAft>
+            </a:pPr>
+            <a:endParaRPr lang="en-US" sz="1333">
+              <a:solidFill>
+                <a:prstClr val="white"/>
+              </a:solidFill>
+              <a:latin typeface="Arial"/>
+            </a:endParaRPr>
+          </a:p>
+        </p:txBody>
+      </p:sp>
+      <p:sp>
+        <p:nvSpPr>
+          <p:cNvPr id="46" name="Rounded Rectangle 45">
+            <a:extLst>
+              <a:ext uri="{FF2B5EF4-FFF2-40B4-BE49-F238E27FC236}">
+                <a16:creationId xmlns:a16="http://schemas.microsoft.com/office/drawing/2014/main" id="{C2EB6E3C-2769-994D-BAE5-C3596A37006C}"/>
+              </a:ext>
+            </a:extLst>
+          </p:cNvPr>
+          <p:cNvSpPr/>
+          <p:nvPr/>
+        </p:nvSpPr>
+        <p:spPr>
+          <a:xfrm>
+            <a:off x="5231135" y="1886921"/>
+            <a:ext cx="1236363" cy="561377"/>
+          </a:xfrm>
+          <a:prstGeom prst="roundRect">
+            <a:avLst>
+              <a:gd name="adj" fmla="val 6277"/>
+            </a:avLst>
+          </a:prstGeom>
+          <a:ln>
+            <a:noFill/>
+          </a:ln>
+        </p:spPr>
+        <p:style>
+          <a:lnRef idx="2">
+            <a:schemeClr val="accent1">
+              <a:shade val="50000"/>
+            </a:schemeClr>
+          </a:lnRef>
+          <a:fillRef idx="1">
+            <a:schemeClr val="accent1"/>
+          </a:fillRef>
+          <a:effectRef idx="0">
+            <a:schemeClr val="accent1"/>
+          </a:effectRef>
+          <a:fontRef idx="minor">
+            <a:schemeClr val="lt1"/>
+          </a:fontRef>
+        </p:style>
+        <p:txBody>
+          <a:bodyPr rtlCol="0" anchor="t"/>
+          <a:lstStyle/>
+          <a:p>
+            <a:pPr defTabSz="914377" eaLnBrk="1" fontAlgn="auto" hangingPunct="1">
+              <a:spcBef>
+                <a:spcPts val="0"/>
+              </a:spcBef>
+              <a:spcAft>
+                <a:spcPts val="0"/>
+              </a:spcAft>
+            </a:pPr>
+            <a:r>
+              <a:rPr lang="en-US" sz="1333" dirty="0">
+                <a:solidFill>
+                  <a:prstClr val="white"/>
+                </a:solidFill>
+                <a:latin typeface="Arial"/>
+              </a:rPr>
+              <a:t>Mongo Sink Connector</a:t>
+            </a:r>
+            <a:endParaRPr sz="1333" dirty="0">
+              <a:solidFill>
+                <a:prstClr val="white"/>
+              </a:solidFill>
+              <a:latin typeface="Arial"/>
+            </a:endParaRPr>
+          </a:p>
+        </p:txBody>
+      </p:sp>
+      <p:sp>
+        <p:nvSpPr>
+          <p:cNvPr id="47" name="AutoShape 4">
+            <a:extLst>
+              <a:ext uri="{FF2B5EF4-FFF2-40B4-BE49-F238E27FC236}">
+                <a16:creationId xmlns:a16="http://schemas.microsoft.com/office/drawing/2014/main" id="{A9C4FCAF-8E51-FB49-A7E9-7E2FB14B5BC6}"/>
+              </a:ext>
+            </a:extLst>
+          </p:cNvPr>
+          <p:cNvSpPr>
+            <a:spLocks noChangeArrowheads="1"/>
+          </p:cNvSpPr>
+          <p:nvPr/>
+        </p:nvSpPr>
+        <p:spPr bwMode="auto">
+          <a:xfrm>
+            <a:off x="4929437" y="1626655"/>
+            <a:ext cx="2059462" cy="1026776"/>
+          </a:xfrm>
+          <a:prstGeom prst="roundRect">
+            <a:avLst>
+              <a:gd name="adj" fmla="val 7117"/>
+            </a:avLst>
+          </a:prstGeom>
+          <a:noFill/>
+          <a:ln w="12700">
+            <a:solidFill>
+              <a:schemeClr val="accent3"/>
+            </a:solidFill>
+            <a:prstDash val="dash"/>
+            <a:round/>
+            <a:headEnd/>
+            <a:tailEnd/>
+          </a:ln>
+        </p:spPr>
+        <p:txBody>
+          <a:bodyPr lIns="0" tIns="0" rIns="0" bIns="0" anchor="b" anchorCtr="1"/>
+          <a:lstStyle/>
+          <a:p>
+            <a:pPr algn="ctr" defTabSz="914377" eaLnBrk="1" fontAlgn="auto" hangingPunct="1">
+              <a:spcBef>
+                <a:spcPts val="0"/>
+              </a:spcBef>
+              <a:spcAft>
+                <a:spcPts val="0"/>
+              </a:spcAft>
+            </a:pPr>
+            <a:r>
+              <a:rPr lang="en-US" sz="1000" dirty="0">
+                <a:solidFill>
+                  <a:prstClr val="black"/>
+                </a:solidFill>
+                <a:latin typeface="Arial"/>
+                <a:cs typeface="+mn-cs"/>
+              </a:rPr>
+              <a:t>Kafka Connect</a:t>
+            </a:r>
+          </a:p>
+        </p:txBody>
+      </p:sp>
+      <p:cxnSp>
+        <p:nvCxnSpPr>
+          <p:cNvPr id="74" name="Elbow Connector 73">
+            <a:extLst>
+              <a:ext uri="{FF2B5EF4-FFF2-40B4-BE49-F238E27FC236}">
+                <a16:creationId xmlns:a16="http://schemas.microsoft.com/office/drawing/2014/main" id="{DF176368-3252-5743-A9A9-26C8B6158017}"/>
+              </a:ext>
+            </a:extLst>
+          </p:cNvPr>
+          <p:cNvCxnSpPr>
+            <a:cxnSpLocks/>
+            <a:stCxn id="7" idx="0"/>
+            <a:endCxn id="46" idx="0"/>
+          </p:cNvCxnSpPr>
+          <p:nvPr/>
+        </p:nvCxnSpPr>
+        <p:spPr>
+          <a:xfrm rot="5400000" flipH="1" flipV="1">
+            <a:off x="3994132" y="1611239"/>
+            <a:ext cx="1579502" cy="2130867"/>
+          </a:xfrm>
+          <a:prstGeom prst="bentConnector3">
+            <a:avLst>
+              <a:gd name="adj1" fmla="val 114473"/>
+            </a:avLst>
+          </a:prstGeom>
+          <a:ln w="12700">
+            <a:solidFill>
+              <a:srgbClr val="0000FF"/>
+            </a:solidFill>
+            <a:tailEnd type="triangle"/>
+          </a:ln>
+          <a:effectLst/>
+        </p:spPr>
+        <p:style>
+          <a:lnRef idx="2">
+            <a:schemeClr val="accent1"/>
+          </a:lnRef>
+          <a:fillRef idx="0">
+            <a:schemeClr val="accent1"/>
+          </a:fillRef>
+          <a:effectRef idx="1">
+            <a:schemeClr val="accent1"/>
+          </a:effectRef>
+          <a:fontRef idx="minor">
+            <a:schemeClr val="tx1"/>
+          </a:fontRef>
+        </p:style>
+      </p:cxnSp>
+      <p:cxnSp>
+        <p:nvCxnSpPr>
+          <p:cNvPr id="77" name="Elbow Connector 76">
+            <a:extLst>
+              <a:ext uri="{FF2B5EF4-FFF2-40B4-BE49-F238E27FC236}">
+                <a16:creationId xmlns:a16="http://schemas.microsoft.com/office/drawing/2014/main" id="{7C34C447-80F7-7E43-A643-36B9516F6892}"/>
+              </a:ext>
+            </a:extLst>
+          </p:cNvPr>
+          <p:cNvCxnSpPr>
+            <a:cxnSpLocks/>
+            <a:stCxn id="22" idx="2"/>
+            <a:endCxn id="10" idx="0"/>
+          </p:cNvCxnSpPr>
+          <p:nvPr/>
+        </p:nvCxnSpPr>
+        <p:spPr>
+          <a:xfrm rot="16200000" flipH="1">
+            <a:off x="2288563" y="1316343"/>
+            <a:ext cx="744332" cy="3555827"/>
+          </a:xfrm>
+          <a:prstGeom prst="bentConnector3">
+            <a:avLst>
+              <a:gd name="adj1" fmla="val 50000"/>
+            </a:avLst>
+          </a:prstGeom>
+          <a:ln w="12700">
+            <a:solidFill>
+              <a:srgbClr val="0000FF"/>
+            </a:solidFill>
+            <a:tailEnd type="triangle"/>
+          </a:ln>
+          <a:effectLst/>
+        </p:spPr>
+        <p:style>
+          <a:lnRef idx="2">
+            <a:schemeClr val="accent1"/>
+          </a:lnRef>
+          <a:fillRef idx="0">
+            <a:schemeClr val="accent1"/>
+          </a:fillRef>
+          <a:effectRef idx="1">
+            <a:schemeClr val="accent1"/>
+          </a:effectRef>
+          <a:fontRef idx="minor">
+            <a:schemeClr val="tx1"/>
+          </a:fontRef>
+        </p:style>
+      </p:cxnSp>
+      <p:pic>
+        <p:nvPicPr>
+          <p:cNvPr id="51" name="Picture 50">
+            <a:extLst>
+              <a:ext uri="{FF2B5EF4-FFF2-40B4-BE49-F238E27FC236}">
+                <a16:creationId xmlns:a16="http://schemas.microsoft.com/office/drawing/2014/main" id="{72259EBF-63F4-504B-8C6D-21BE6316B0B5}"/>
+              </a:ext>
+            </a:extLst>
+          </p:cNvPr>
+          <p:cNvPicPr>
+            <a:picLocks noChangeAspect="1"/>
+          </p:cNvPicPr>
+          <p:nvPr/>
+        </p:nvPicPr>
+        <p:blipFill>
+          <a:blip r:embed="rId2">
+            <a:biLevel thresh="75000"/>
+            <a:extLst>
+              <a:ext uri="{BEBA8EAE-BF5A-486C-A8C5-ECC9F3942E4B}">
+                <a14:imgProps xmlns:a14="http://schemas.microsoft.com/office/drawing/2010/main">
+                  <a14:imgLayer r:embed="rId3">
+                    <a14:imgEffect>
+                      <a14:artisticPhotocopy/>
+                    </a14:imgEffect>
+                  </a14:imgLayer>
+                </a14:imgProps>
+              </a:ext>
+              <a:ext uri="{28A0092B-C50C-407E-A947-70E740481C1C}">
+                <a14:useLocalDpi xmlns:a14="http://schemas.microsoft.com/office/drawing/2010/main" val="0"/>
+              </a:ext>
+            </a:extLst>
+          </a:blip>
+          <a:stretch>
+            <a:fillRect/>
+          </a:stretch>
+        </p:blipFill>
+        <p:spPr>
+          <a:xfrm>
+            <a:off x="2175582" y="4164287"/>
+            <a:ext cx="727588" cy="382450"/>
+          </a:xfrm>
+          <a:prstGeom prst="rect">
+            <a:avLst/>
+          </a:prstGeom>
+        </p:spPr>
+      </p:pic>
+      <p:sp>
+        <p:nvSpPr>
+          <p:cNvPr id="54" name="AutoShape 4">
+            <a:extLst>
+              <a:ext uri="{FF2B5EF4-FFF2-40B4-BE49-F238E27FC236}">
+                <a16:creationId xmlns:a16="http://schemas.microsoft.com/office/drawing/2014/main" id="{65A22633-8060-754D-8769-190F9DE657FF}"/>
+              </a:ext>
+            </a:extLst>
+          </p:cNvPr>
+          <p:cNvSpPr>
+            <a:spLocks noChangeArrowheads="1"/>
+          </p:cNvSpPr>
+          <p:nvPr/>
+        </p:nvSpPr>
+        <p:spPr bwMode="auto">
+          <a:xfrm>
+            <a:off x="206124" y="1081925"/>
+            <a:ext cx="7294272" cy="3802591"/>
+          </a:xfrm>
+          <a:prstGeom prst="roundRect">
+            <a:avLst>
+              <a:gd name="adj" fmla="val 2714"/>
+            </a:avLst>
+          </a:prstGeom>
+          <a:noFill/>
+          <a:ln w="19050">
+            <a:solidFill>
+              <a:srgbClr val="FF0000"/>
+            </a:solidFill>
+            <a:prstDash val="solid"/>
+            <a:round/>
+            <a:headEnd/>
+            <a:tailEnd/>
+          </a:ln>
+        </p:spPr>
+        <p:txBody>
+          <a:bodyPr lIns="0" tIns="0" rIns="0" bIns="0" anchor="b" anchorCtr="1"/>
+          <a:lstStyle/>
+          <a:p>
+            <a:pPr algn="ctr" defTabSz="914377" eaLnBrk="1" fontAlgn="auto" hangingPunct="1">
+              <a:spcBef>
+                <a:spcPts val="0"/>
+              </a:spcBef>
+              <a:spcAft>
+                <a:spcPts val="0"/>
+              </a:spcAft>
+              <a:defRPr/>
+            </a:pPr>
+            <a:r>
+              <a:rPr lang="en-US" sz="1200" dirty="0">
+                <a:solidFill>
+                  <a:srgbClr val="FF0000"/>
+                </a:solidFill>
+                <a:latin typeface="Arial"/>
+              </a:rPr>
+              <a:t>ROKS - OpenShift</a:t>
+            </a:r>
+            <a:endParaRPr lang="en-US" sz="1200" dirty="0">
+              <a:solidFill>
+                <a:srgbClr val="FF0000"/>
+              </a:solidFill>
+              <a:latin typeface="Arial"/>
+              <a:cs typeface="+mn-cs"/>
+            </a:endParaRPr>
+          </a:p>
+        </p:txBody>
+      </p:sp>
+      <p:pic>
+        <p:nvPicPr>
+          <p:cNvPr id="33" name="Picture 32">
+            <a:extLst>
+              <a:ext uri="{FF2B5EF4-FFF2-40B4-BE49-F238E27FC236}">
+                <a16:creationId xmlns:a16="http://schemas.microsoft.com/office/drawing/2014/main" id="{70523479-724D-5746-B9D9-C455745DD3F4}"/>
+              </a:ext>
+            </a:extLst>
+          </p:cNvPr>
+          <p:cNvPicPr>
+            <a:picLocks noChangeAspect="1"/>
+          </p:cNvPicPr>
+          <p:nvPr/>
+        </p:nvPicPr>
+        <p:blipFill>
+          <a:blip r:embed="rId4"/>
+          <a:stretch>
+            <a:fillRect/>
+          </a:stretch>
+        </p:blipFill>
+        <p:spPr>
+          <a:xfrm>
+            <a:off x="8462466" y="2847548"/>
+            <a:ext cx="896943" cy="271344"/>
+          </a:xfrm>
+          <a:prstGeom prst="rect">
+            <a:avLst/>
+          </a:prstGeom>
+        </p:spPr>
+      </p:pic>
+      <p:cxnSp>
+        <p:nvCxnSpPr>
+          <p:cNvPr id="34" name="Elbow Connector 33">
+            <a:extLst>
+              <a:ext uri="{FF2B5EF4-FFF2-40B4-BE49-F238E27FC236}">
+                <a16:creationId xmlns:a16="http://schemas.microsoft.com/office/drawing/2014/main" id="{C87900B7-2D11-E549-A3AC-DF54471ECB61}"/>
+              </a:ext>
+            </a:extLst>
+          </p:cNvPr>
+          <p:cNvCxnSpPr>
+            <a:cxnSpLocks/>
+            <a:stCxn id="46" idx="3"/>
+            <a:endCxn id="33" idx="0"/>
+          </p:cNvCxnSpPr>
+          <p:nvPr/>
+        </p:nvCxnSpPr>
+        <p:spPr>
+          <a:xfrm>
+            <a:off x="6467498" y="2167610"/>
+            <a:ext cx="2443440" cy="679938"/>
+          </a:xfrm>
+          <a:prstGeom prst="bentConnector2">
+            <a:avLst/>
+          </a:prstGeom>
+          <a:ln>
+            <a:solidFill>
+              <a:schemeClr val="accent1"/>
+            </a:solidFill>
+            <a:tailEnd type="triangle"/>
+          </a:ln>
+          <a:effectLst/>
+        </p:spPr>
+        <p:style>
+          <a:lnRef idx="2">
+            <a:schemeClr val="accent1"/>
+          </a:lnRef>
+          <a:fillRef idx="0">
+            <a:schemeClr val="accent1"/>
+          </a:fillRef>
+          <a:effectRef idx="1">
+            <a:schemeClr val="accent1"/>
+          </a:effectRef>
+          <a:fontRef idx="minor">
+            <a:schemeClr val="tx1"/>
+          </a:fontRef>
+        </p:style>
+      </p:cxnSp>
+    </p:spTree>
+    <p:extLst>
+      <p:ext uri="{BB962C8B-B14F-4D97-AF65-F5344CB8AC3E}">
+        <p14:creationId xmlns:p14="http://schemas.microsoft.com/office/powerpoint/2010/main" val="859430405"/>
       </p:ext>
     </p:extLst>
   </p:cSld>

</xml_diff>